<commit_message>
Update Facial Emotion Recognition.pptx
</commit_message>
<xml_diff>
--- a/Facial Emotion Recognition.pptx
+++ b/Facial Emotion Recognition.pptx
@@ -104,6 +104,11 @@
       </a:defRPr>
     </a:lvl9pPr>
   </p:defaultTextStyle>
+  <p:extLst>
+    <p:ext uri="{EFAFB233-063F-42B5-8137-9DF3F51BA10A}">
+      <p15:sldGuideLst xmlns:p15="http://schemas.microsoft.com/office/powerpoint/2012/main"/>
+    </p:ext>
+  </p:extLst>
 </p:presentation>
 </file>
 
@@ -3352,10 +3357,10 @@
       </p:grpSpPr>
       <p:sp useBgFill="1">
         <p:nvSpPr>
-          <p:cNvPr id="192" name="Rectangle 191">
-            <a:extLst>
-              <a:ext uri="{FF2B5EF4-FFF2-40B4-BE49-F238E27FC236}">
-                <a16:creationId xmlns:a16="http://schemas.microsoft.com/office/drawing/2014/main" id="{7316481C-0A49-4796-812B-0D64F063B720}"/>
+          <p:cNvPr id="133" name="Rectangle 132">
+            <a:extLst>
+              <a:ext uri="{FF2B5EF4-FFF2-40B4-BE49-F238E27FC236}">
+                <a16:creationId xmlns:a16="http://schemas.microsoft.com/office/drawing/2014/main" id="{407C9FC5-0C1E-42A8-97E6-F940775A0575}"/>
               </a:ext>
               <a:ext uri="{C183D7F6-B498-43B3-948B-1728B52AA6E4}">
                 <adec:decorative xmlns:adec="http://schemas.microsoft.com/office/drawing/2017/decorative" val="1"/>
@@ -3373,10 +3378,10 @@
             </p:extLst>
           </p:nvPr>
         </p:nvSpPr>
-        <p:spPr>
+        <p:spPr bwMode="white">
           <a:xfrm>
             <a:off x="0" y="0"/>
-            <a:ext cx="12191999" cy="6858000"/>
+            <a:ext cx="12192000" cy="6858000"/>
           </a:xfrm>
           <a:prstGeom prst="rect">
             <a:avLst/>
@@ -3403,7 +3408,101 @@
         </p:style>
         <p:txBody>
           <a:bodyPr rtlCol="0" anchor="ctr"/>
-          <a:lstStyle/>
+          <a:lstStyle>
+            <a:defPPr>
+              <a:defRPr lang="en-US"/>
+            </a:defPPr>
+            <a:lvl1pPr marL="0" algn="l" defTabSz="914400" rtl="0" eaLnBrk="1" latinLnBrk="0" hangingPunct="1">
+              <a:defRPr sz="1800" kern="1200">
+                <a:solidFill>
+                  <a:schemeClr val="lt1"/>
+                </a:solidFill>
+                <a:latin typeface="+mn-lt"/>
+                <a:ea typeface="+mn-ea"/>
+                <a:cs typeface="+mn-cs"/>
+              </a:defRPr>
+            </a:lvl1pPr>
+            <a:lvl2pPr marL="457200" algn="l" defTabSz="914400" rtl="0" eaLnBrk="1" latinLnBrk="0" hangingPunct="1">
+              <a:defRPr sz="1800" kern="1200">
+                <a:solidFill>
+                  <a:schemeClr val="lt1"/>
+                </a:solidFill>
+                <a:latin typeface="+mn-lt"/>
+                <a:ea typeface="+mn-ea"/>
+                <a:cs typeface="+mn-cs"/>
+              </a:defRPr>
+            </a:lvl2pPr>
+            <a:lvl3pPr marL="914400" algn="l" defTabSz="914400" rtl="0" eaLnBrk="1" latinLnBrk="0" hangingPunct="1">
+              <a:defRPr sz="1800" kern="1200">
+                <a:solidFill>
+                  <a:schemeClr val="lt1"/>
+                </a:solidFill>
+                <a:latin typeface="+mn-lt"/>
+                <a:ea typeface="+mn-ea"/>
+                <a:cs typeface="+mn-cs"/>
+              </a:defRPr>
+            </a:lvl3pPr>
+            <a:lvl4pPr marL="1371600" algn="l" defTabSz="914400" rtl="0" eaLnBrk="1" latinLnBrk="0" hangingPunct="1">
+              <a:defRPr sz="1800" kern="1200">
+                <a:solidFill>
+                  <a:schemeClr val="lt1"/>
+                </a:solidFill>
+                <a:latin typeface="+mn-lt"/>
+                <a:ea typeface="+mn-ea"/>
+                <a:cs typeface="+mn-cs"/>
+              </a:defRPr>
+            </a:lvl4pPr>
+            <a:lvl5pPr marL="1828800" algn="l" defTabSz="914400" rtl="0" eaLnBrk="1" latinLnBrk="0" hangingPunct="1">
+              <a:defRPr sz="1800" kern="1200">
+                <a:solidFill>
+                  <a:schemeClr val="lt1"/>
+                </a:solidFill>
+                <a:latin typeface="+mn-lt"/>
+                <a:ea typeface="+mn-ea"/>
+                <a:cs typeface="+mn-cs"/>
+              </a:defRPr>
+            </a:lvl5pPr>
+            <a:lvl6pPr marL="2286000" algn="l" defTabSz="914400" rtl="0" eaLnBrk="1" latinLnBrk="0" hangingPunct="1">
+              <a:defRPr sz="1800" kern="1200">
+                <a:solidFill>
+                  <a:schemeClr val="lt1"/>
+                </a:solidFill>
+                <a:latin typeface="+mn-lt"/>
+                <a:ea typeface="+mn-ea"/>
+                <a:cs typeface="+mn-cs"/>
+              </a:defRPr>
+            </a:lvl6pPr>
+            <a:lvl7pPr marL="2743200" algn="l" defTabSz="914400" rtl="0" eaLnBrk="1" latinLnBrk="0" hangingPunct="1">
+              <a:defRPr sz="1800" kern="1200">
+                <a:solidFill>
+                  <a:schemeClr val="lt1"/>
+                </a:solidFill>
+                <a:latin typeface="+mn-lt"/>
+                <a:ea typeface="+mn-ea"/>
+                <a:cs typeface="+mn-cs"/>
+              </a:defRPr>
+            </a:lvl7pPr>
+            <a:lvl8pPr marL="3200400" algn="l" defTabSz="914400" rtl="0" eaLnBrk="1" latinLnBrk="0" hangingPunct="1">
+              <a:defRPr sz="1800" kern="1200">
+                <a:solidFill>
+                  <a:schemeClr val="lt1"/>
+                </a:solidFill>
+                <a:latin typeface="+mn-lt"/>
+                <a:ea typeface="+mn-ea"/>
+                <a:cs typeface="+mn-cs"/>
+              </a:defRPr>
+            </a:lvl8pPr>
+            <a:lvl9pPr marL="3657600" algn="l" defTabSz="914400" rtl="0" eaLnBrk="1" latinLnBrk="0" hangingPunct="1">
+              <a:defRPr sz="1800" kern="1200">
+                <a:solidFill>
+                  <a:schemeClr val="lt1"/>
+                </a:solidFill>
+                <a:latin typeface="+mn-lt"/>
+                <a:ea typeface="+mn-ea"/>
+                <a:cs typeface="+mn-cs"/>
+              </a:defRPr>
+            </a:lvl9pPr>
+          </a:lstStyle>
           <a:p>
             <a:pPr algn="ctr"/>
             <a:endParaRPr lang="en-US"/>
@@ -3428,19 +3527,19 @@
         </p:nvSpPr>
         <p:spPr>
           <a:xfrm>
-            <a:off x="1036684" y="1152144"/>
-            <a:ext cx="3888999" cy="3072393"/>
+            <a:off x="1524000" y="4218281"/>
+            <a:ext cx="4265007" cy="1885199"/>
           </a:xfrm>
         </p:spPr>
         <p:txBody>
-          <a:bodyPr>
+          <a:bodyPr anchor="ctr">
             <a:normAutofit/>
           </a:bodyPr>
           <a:lstStyle/>
           <a:p>
             <a:pPr algn="l"/>
             <a:r>
-              <a:rPr lang="en-CA" sz="5600" b="1" dirty="0"/>
+              <a:rPr lang="en-CA" sz="5100" b="1"/>
               <a:t>Facial Emotion Recognition</a:t>
             </a:r>
           </a:p>
@@ -3464,12 +3563,12 @@
         </p:nvSpPr>
         <p:spPr>
           <a:xfrm>
-            <a:off x="1036684" y="4386170"/>
-            <a:ext cx="4033156" cy="2223008"/>
+            <a:off x="6018412" y="4218281"/>
+            <a:ext cx="4649588" cy="1885199"/>
           </a:xfrm>
         </p:spPr>
         <p:txBody>
-          <a:bodyPr anchor="t">
+          <a:bodyPr anchor="ctr">
             <a:normAutofit/>
           </a:bodyPr>
           <a:lstStyle/>
@@ -3477,18 +3576,17 @@
             <a:pPr algn="l"/>
             <a:r>
               <a:rPr lang="en-US" sz="1400" dirty="0"/>
-              <a:t>Emotions play an important role not only in our relations with other people but also in the way we use computers. Affective computing is a domain that focuses on user emotions while he or she interacts with computers and applications. As emotional state of a person may affect concentration, task solving and decision making skills, the vision of affective computing is to make systems able to recognize human emotions and influence them in order to enhance productivity and effectiveness of working with computers. </a:t>
-            </a:r>
-            <a:endParaRPr lang="en-CA" sz="1400" dirty="0"/>
-          </a:p>
-        </p:txBody>
-      </p:sp>
-      <p:sp>
-        <p:nvSpPr>
-          <p:cNvPr id="193" name="Rectangle 192">
-            <a:extLst>
-              <a:ext uri="{FF2B5EF4-FFF2-40B4-BE49-F238E27FC236}">
-                <a16:creationId xmlns:a16="http://schemas.microsoft.com/office/drawing/2014/main" id="{A5271697-90F1-4A23-8EF2-0179F2EAFACB}"/>
+              <a:t>Facial emotion recognition is the process of detecting human emotions from facial expressions. Real time facial emotion recognition systems are nowadays used in a variety of ways, from automatically monitoring driver and occupant state in the car to interview purposes in companies. In this project we would like to use AI solutions to reconstruct this technology and then review the results and discuss on ways to improve them in future projects.</a:t>
+            </a:r>
+          </a:p>
+        </p:txBody>
+      </p:sp>
+      <p:sp>
+        <p:nvSpPr>
+          <p:cNvPr id="135" name="Oval 134">
+            <a:extLst>
+              <a:ext uri="{FF2B5EF4-FFF2-40B4-BE49-F238E27FC236}">
+                <a16:creationId xmlns:a16="http://schemas.microsoft.com/office/drawing/2014/main" id="{9EE371B4-A1D9-4EFE-8FE1-000495831EFA}"/>
               </a:ext>
               <a:ext uri="{C183D7F6-B498-43B3-948B-1728B52AA6E4}">
                 <adec:decorative xmlns:adec="http://schemas.microsoft.com/office/drawing/2017/decorative" val="1"/>
@@ -3508,17 +3606,14 @@
         </p:nvSpPr>
         <p:spPr>
           <a:xfrm>
-            <a:off x="-1" y="1"/>
-            <a:ext cx="606972" cy="3233984"/>
+            <a:off x="813617" y="4218281"/>
+            <a:ext cx="546100" cy="546100"/>
           </a:xfrm>
-          <a:prstGeom prst="rect">
+          <a:prstGeom prst="ellipse">
             <a:avLst/>
           </a:prstGeom>
           <a:solidFill>
-            <a:schemeClr val="tx1">
-              <a:lumMod val="85000"/>
-              <a:lumOff val="15000"/>
-            </a:schemeClr>
+            <a:schemeClr val="accent5"/>
           </a:solidFill>
           <a:ln>
             <a:noFill/>
@@ -3544,26 +3639,52 @@
           <a:bodyPr rtlCol="0" anchor="ctr"/>
           <a:lstStyle/>
           <a:p>
-            <a:pPr algn="ctr"/>
-            <a:endParaRPr lang="en-US"/>
-          </a:p>
-        </p:txBody>
-      </p:sp>
-      <p:grpSp>
-        <p:nvGrpSpPr>
-          <p:cNvPr id="194" name="Group 193">
-            <a:extLst>
-              <a:ext uri="{FF2B5EF4-FFF2-40B4-BE49-F238E27FC236}">
-                <a16:creationId xmlns:a16="http://schemas.microsoft.com/office/drawing/2014/main" id="{0924561D-756D-410B-973A-E68C2552C20C}"/>
+            <a:pPr marL="0" marR="0" lvl="0" indent="0" algn="ctr" defTabSz="914400" rtl="0" eaLnBrk="1" fontAlgn="auto" latinLnBrk="0" hangingPunct="1">
+              <a:lnSpc>
+                <a:spcPct val="100000"/>
+              </a:lnSpc>
+              <a:spcBef>
+                <a:spcPts val="0"/>
+              </a:spcBef>
+              <a:spcAft>
+                <a:spcPts val="0"/>
+              </a:spcAft>
+              <a:buClrTx/>
+              <a:buSzTx/>
+              <a:buFontTx/>
+              <a:buNone/>
+              <a:tabLst/>
+              <a:defRPr/>
+            </a:pPr>
+            <a:endParaRPr kumimoji="0" lang="en-US" sz="1800" b="0" i="0" u="none" strike="noStrike" kern="1200" cap="none" spc="0" normalizeH="0" baseline="0" noProof="0">
+              <a:solidFill>
+                <a:schemeClr val="accent5"/>
+              </a:solidFill>
+              <a:effectLst/>
+              <a:uLnTx/>
+              <a:uFillTx/>
+              <a:latin typeface="Calibri" panose="020F0502020204030204"/>
+              <a:ea typeface="+mn-ea"/>
+              <a:cs typeface="+mn-cs"/>
+            </a:endParaRPr>
+          </a:p>
+        </p:txBody>
+      </p:sp>
+      <p:sp>
+        <p:nvSpPr>
+          <p:cNvPr id="137" name="Arc 136">
+            <a:extLst>
+              <a:ext uri="{FF2B5EF4-FFF2-40B4-BE49-F238E27FC236}">
+                <a16:creationId xmlns:a16="http://schemas.microsoft.com/office/drawing/2014/main" id="{2E19C174-9C7C-461E-970B-432019901562}"/>
               </a:ext>
               <a:ext uri="{C183D7F6-B498-43B3-948B-1728B52AA6E4}">
                 <adec:decorative xmlns:adec="http://schemas.microsoft.com/office/drawing/2017/decorative" val="1"/>
               </a:ext>
             </a:extLst>
           </p:cNvPr>
-          <p:cNvGrpSpPr>
-            <a:grpSpLocks noGrp="1" noUngrp="1" noRot="1" noChangeAspect="1" noMove="1" noResize="1"/>
-          </p:cNvGrpSpPr>
+          <p:cNvSpPr>
+            <a:spLocks noGrp="1" noRot="1" noChangeAspect="1" noMove="1" noResize="1" noEditPoints="1" noAdjustHandles="1" noChangeArrowheads="1" noChangeShapeType="1" noTextEdit="1"/>
+          </p:cNvSpPr>
           <p:nvPr>
             <p:extLst>
               <p:ext uri="{386F3935-93C4-4BCD-93E2-E3B085C9AB24}">
@@ -3571,1344 +3692,113 @@
               </p:ext>
             </p:extLst>
           </p:nvPr>
-        </p:nvGrpSpPr>
-        <p:grpSpPr>
-          <a:xfrm>
-            <a:off x="1188720" y="73152"/>
-            <a:ext cx="1178966" cy="232963"/>
-            <a:chOff x="7763256" y="73152"/>
-            <a:chExt cx="1178966" cy="232963"/>
-          </a:xfrm>
-        </p:grpSpPr>
-        <p:sp>
-          <p:nvSpPr>
-            <p:cNvPr id="195" name="Rectangle 64">
-              <a:extLst>
-                <a:ext uri="{FF2B5EF4-FFF2-40B4-BE49-F238E27FC236}">
-                  <a16:creationId xmlns:a16="http://schemas.microsoft.com/office/drawing/2014/main" id="{77AF0971-0074-4E4E-9318-C1990C6FF2B1}"/>
-                </a:ext>
-                <a:ext uri="{C183D7F6-B498-43B3-948B-1728B52AA6E4}">
-                  <adec:decorative xmlns:adec="http://schemas.microsoft.com/office/drawing/2017/decorative" val="1"/>
-                </a:ext>
-              </a:extLst>
-            </p:cNvPr>
-            <p:cNvSpPr/>
-            <p:nvPr>
-              <p:extLst>
-                <p:ext uri="{386F3935-93C4-4BCD-93E2-E3B085C9AB24}">
-                  <p16:designElem xmlns:p16="http://schemas.microsoft.com/office/powerpoint/2015/main" val="1"/>
-                </p:ext>
-              </p:extLst>
-            </p:nvPr>
-          </p:nvSpPr>
-          <p:spPr>
-            <a:xfrm>
-              <a:off x="8263077" y="73152"/>
-              <a:ext cx="54368" cy="59227"/>
-            </a:xfrm>
-            <a:prstGeom prst="ellipse">
-              <a:avLst/>
-            </a:prstGeom>
-            <a:solidFill>
-              <a:schemeClr val="accent1"/>
-            </a:solidFill>
-            <a:ln>
-              <a:noFill/>
-            </a:ln>
-          </p:spPr>
-          <p:style>
-            <a:lnRef idx="2">
-              <a:schemeClr val="accent1">
-                <a:shade val="50000"/>
-              </a:schemeClr>
-            </a:lnRef>
-            <a:fillRef idx="1">
-              <a:schemeClr val="accent1"/>
-            </a:fillRef>
-            <a:effectRef idx="0">
-              <a:schemeClr val="accent1"/>
-            </a:effectRef>
-            <a:fontRef idx="minor">
-              <a:schemeClr val="lt1"/>
-            </a:fontRef>
-          </p:style>
-          <p:txBody>
-            <a:bodyPr rtlCol="0" anchor="ctr"/>
-            <a:lstStyle/>
-            <a:p>
-              <a:pPr algn="ctr"/>
-              <a:endParaRPr lang="en-US"/>
-            </a:p>
-          </p:txBody>
-        </p:sp>
-        <p:sp>
-          <p:nvSpPr>
-            <p:cNvPr id="196" name="Rectangle 66">
-              <a:extLst>
-                <a:ext uri="{FF2B5EF4-FFF2-40B4-BE49-F238E27FC236}">
-                  <a16:creationId xmlns:a16="http://schemas.microsoft.com/office/drawing/2014/main" id="{0849707A-24B1-45E4-8493-5DC15C5782FC}"/>
-                </a:ext>
-                <a:ext uri="{C183D7F6-B498-43B3-948B-1728B52AA6E4}">
-                  <adec:decorative xmlns:adec="http://schemas.microsoft.com/office/drawing/2017/decorative" val="1"/>
-                </a:ext>
-              </a:extLst>
-            </p:cNvPr>
-            <p:cNvSpPr/>
-            <p:nvPr>
-              <p:extLst>
-                <p:ext uri="{386F3935-93C4-4BCD-93E2-E3B085C9AB24}">
-                  <p16:designElem xmlns:p16="http://schemas.microsoft.com/office/powerpoint/2015/main" val="1"/>
-                </p:ext>
-              </p:extLst>
-            </p:nvPr>
-          </p:nvSpPr>
-          <p:spPr>
-            <a:xfrm>
-              <a:off x="8263077" y="246888"/>
-              <a:ext cx="54368" cy="59227"/>
-            </a:xfrm>
-            <a:prstGeom prst="ellipse">
-              <a:avLst/>
-            </a:prstGeom>
-            <a:solidFill>
-              <a:schemeClr val="accent1"/>
-            </a:solidFill>
-            <a:ln>
-              <a:noFill/>
-            </a:ln>
-          </p:spPr>
-          <p:style>
-            <a:lnRef idx="2">
-              <a:schemeClr val="accent1">
-                <a:shade val="50000"/>
-              </a:schemeClr>
-            </a:lnRef>
-            <a:fillRef idx="1">
-              <a:schemeClr val="accent1"/>
-            </a:fillRef>
-            <a:effectRef idx="0">
-              <a:schemeClr val="accent1"/>
-            </a:effectRef>
-            <a:fontRef idx="minor">
-              <a:schemeClr val="lt1"/>
-            </a:fontRef>
-          </p:style>
-          <p:txBody>
-            <a:bodyPr rtlCol="0" anchor="ctr"/>
-            <a:lstStyle/>
-            <a:p>
-              <a:pPr algn="ctr"/>
-              <a:endParaRPr lang="en-US"/>
-            </a:p>
-          </p:txBody>
-        </p:sp>
-        <p:sp>
-          <p:nvSpPr>
-            <p:cNvPr id="197" name="Rectangle 64">
-              <a:extLst>
-                <a:ext uri="{FF2B5EF4-FFF2-40B4-BE49-F238E27FC236}">
-                  <a16:creationId xmlns:a16="http://schemas.microsoft.com/office/drawing/2014/main" id="{E0FFD705-F03C-46B0-ABB9-3C24E09312A5}"/>
-                </a:ext>
-                <a:ext uri="{C183D7F6-B498-43B3-948B-1728B52AA6E4}">
-                  <adec:decorative xmlns:adec="http://schemas.microsoft.com/office/drawing/2017/decorative" val="1"/>
-                </a:ext>
-              </a:extLst>
-            </p:cNvPr>
-            <p:cNvSpPr/>
-            <p:nvPr>
-              <p:extLst>
-                <p:ext uri="{386F3935-93C4-4BCD-93E2-E3B085C9AB24}">
-                  <p16:designElem xmlns:p16="http://schemas.microsoft.com/office/powerpoint/2015/main" val="1"/>
-                </p:ext>
-              </p:extLst>
-            </p:nvPr>
-          </p:nvSpPr>
-          <p:spPr>
-            <a:xfrm>
-              <a:off x="8138122" y="73152"/>
-              <a:ext cx="54368" cy="59227"/>
-            </a:xfrm>
-            <a:prstGeom prst="ellipse">
-              <a:avLst/>
-            </a:prstGeom>
-            <a:solidFill>
-              <a:schemeClr val="accent1"/>
-            </a:solidFill>
-            <a:ln>
-              <a:noFill/>
-            </a:ln>
-          </p:spPr>
-          <p:style>
-            <a:lnRef idx="2">
-              <a:schemeClr val="accent1">
-                <a:shade val="50000"/>
-              </a:schemeClr>
-            </a:lnRef>
-            <a:fillRef idx="1">
-              <a:schemeClr val="accent1"/>
-            </a:fillRef>
-            <a:effectRef idx="0">
-              <a:schemeClr val="accent1"/>
-            </a:effectRef>
-            <a:fontRef idx="minor">
-              <a:schemeClr val="lt1"/>
-            </a:fontRef>
-          </p:style>
-          <p:txBody>
-            <a:bodyPr rtlCol="0" anchor="ctr"/>
-            <a:lstStyle/>
-            <a:p>
-              <a:pPr algn="ctr"/>
-              <a:endParaRPr lang="en-US"/>
-            </a:p>
-          </p:txBody>
-        </p:sp>
-        <p:sp>
-          <p:nvSpPr>
-            <p:cNvPr id="198" name="Rectangle 66">
-              <a:extLst>
-                <a:ext uri="{FF2B5EF4-FFF2-40B4-BE49-F238E27FC236}">
-                  <a16:creationId xmlns:a16="http://schemas.microsoft.com/office/drawing/2014/main" id="{520B12C0-88D0-4F6F-9F29-38E4D1D61022}"/>
-                </a:ext>
-                <a:ext uri="{C183D7F6-B498-43B3-948B-1728B52AA6E4}">
-                  <adec:decorative xmlns:adec="http://schemas.microsoft.com/office/drawing/2017/decorative" val="1"/>
-                </a:ext>
-              </a:extLst>
-            </p:cNvPr>
-            <p:cNvSpPr/>
-            <p:nvPr>
-              <p:extLst>
-                <p:ext uri="{386F3935-93C4-4BCD-93E2-E3B085C9AB24}">
-                  <p16:designElem xmlns:p16="http://schemas.microsoft.com/office/powerpoint/2015/main" val="1"/>
-                </p:ext>
-              </p:extLst>
-            </p:nvPr>
-          </p:nvSpPr>
-          <p:spPr>
-            <a:xfrm>
-              <a:off x="8138122" y="246888"/>
-              <a:ext cx="54368" cy="59227"/>
-            </a:xfrm>
-            <a:prstGeom prst="ellipse">
-              <a:avLst/>
-            </a:prstGeom>
-            <a:solidFill>
-              <a:schemeClr val="accent1"/>
-            </a:solidFill>
-            <a:ln>
-              <a:noFill/>
-            </a:ln>
-          </p:spPr>
-          <p:style>
-            <a:lnRef idx="2">
-              <a:schemeClr val="accent1">
-                <a:shade val="50000"/>
-              </a:schemeClr>
-            </a:lnRef>
-            <a:fillRef idx="1">
-              <a:schemeClr val="accent1"/>
-            </a:fillRef>
-            <a:effectRef idx="0">
-              <a:schemeClr val="accent1"/>
-            </a:effectRef>
-            <a:fontRef idx="minor">
-              <a:schemeClr val="lt1"/>
-            </a:fontRef>
-          </p:style>
-          <p:txBody>
-            <a:bodyPr rtlCol="0" anchor="ctr"/>
-            <a:lstStyle/>
-            <a:p>
-              <a:pPr algn="ctr"/>
-              <a:endParaRPr lang="en-US"/>
-            </a:p>
-          </p:txBody>
-        </p:sp>
-        <p:sp>
-          <p:nvSpPr>
-            <p:cNvPr id="199" name="Rectangle 64">
-              <a:extLst>
-                <a:ext uri="{FF2B5EF4-FFF2-40B4-BE49-F238E27FC236}">
-                  <a16:creationId xmlns:a16="http://schemas.microsoft.com/office/drawing/2014/main" id="{DEDD5A45-3641-4FE7-8375-EECF2DC9D002}"/>
-                </a:ext>
-                <a:ext uri="{C183D7F6-B498-43B3-948B-1728B52AA6E4}">
-                  <adec:decorative xmlns:adec="http://schemas.microsoft.com/office/drawing/2017/decorative" val="1"/>
-                </a:ext>
-              </a:extLst>
-            </p:cNvPr>
-            <p:cNvSpPr/>
-            <p:nvPr>
-              <p:extLst>
-                <p:ext uri="{386F3935-93C4-4BCD-93E2-E3B085C9AB24}">
-                  <p16:designElem xmlns:p16="http://schemas.microsoft.com/office/powerpoint/2015/main" val="1"/>
-                </p:ext>
-              </p:extLst>
-            </p:nvPr>
-          </p:nvSpPr>
-          <p:spPr>
-            <a:xfrm>
-              <a:off x="8013167" y="73152"/>
-              <a:ext cx="54368" cy="59227"/>
-            </a:xfrm>
-            <a:prstGeom prst="ellipse">
-              <a:avLst/>
-            </a:prstGeom>
-            <a:solidFill>
-              <a:schemeClr val="accent1"/>
-            </a:solidFill>
-            <a:ln>
-              <a:noFill/>
-            </a:ln>
-          </p:spPr>
-          <p:style>
-            <a:lnRef idx="2">
-              <a:schemeClr val="accent1">
-                <a:shade val="50000"/>
-              </a:schemeClr>
-            </a:lnRef>
-            <a:fillRef idx="1">
-              <a:schemeClr val="accent1"/>
-            </a:fillRef>
-            <a:effectRef idx="0">
-              <a:schemeClr val="accent1"/>
-            </a:effectRef>
-            <a:fontRef idx="minor">
-              <a:schemeClr val="lt1"/>
-            </a:fontRef>
-          </p:style>
-          <p:txBody>
-            <a:bodyPr rtlCol="0" anchor="ctr"/>
-            <a:lstStyle/>
-            <a:p>
-              <a:pPr algn="ctr"/>
-              <a:endParaRPr lang="en-US"/>
-            </a:p>
-          </p:txBody>
-        </p:sp>
-        <p:sp>
-          <p:nvSpPr>
-            <p:cNvPr id="200" name="Rectangle 66">
-              <a:extLst>
-                <a:ext uri="{FF2B5EF4-FFF2-40B4-BE49-F238E27FC236}">
-                  <a16:creationId xmlns:a16="http://schemas.microsoft.com/office/drawing/2014/main" id="{89BF55CA-60FC-479D-A85E-48626FC13567}"/>
-                </a:ext>
-                <a:ext uri="{C183D7F6-B498-43B3-948B-1728B52AA6E4}">
-                  <adec:decorative xmlns:adec="http://schemas.microsoft.com/office/drawing/2017/decorative" val="1"/>
-                </a:ext>
-              </a:extLst>
-            </p:cNvPr>
-            <p:cNvSpPr/>
-            <p:nvPr>
-              <p:extLst>
-                <p:ext uri="{386F3935-93C4-4BCD-93E2-E3B085C9AB24}">
-                  <p16:designElem xmlns:p16="http://schemas.microsoft.com/office/powerpoint/2015/main" val="1"/>
-                </p:ext>
-              </p:extLst>
-            </p:nvPr>
-          </p:nvSpPr>
-          <p:spPr>
-            <a:xfrm>
-              <a:off x="8013167" y="246888"/>
-              <a:ext cx="54368" cy="59227"/>
-            </a:xfrm>
-            <a:prstGeom prst="ellipse">
-              <a:avLst/>
-            </a:prstGeom>
-            <a:solidFill>
-              <a:schemeClr val="accent1"/>
-            </a:solidFill>
-            <a:ln>
-              <a:noFill/>
-            </a:ln>
-          </p:spPr>
-          <p:style>
-            <a:lnRef idx="2">
-              <a:schemeClr val="accent1">
-                <a:shade val="50000"/>
-              </a:schemeClr>
-            </a:lnRef>
-            <a:fillRef idx="1">
-              <a:schemeClr val="accent1"/>
-            </a:fillRef>
-            <a:effectRef idx="0">
-              <a:schemeClr val="accent1"/>
-            </a:effectRef>
-            <a:fontRef idx="minor">
-              <a:schemeClr val="lt1"/>
-            </a:fontRef>
-          </p:style>
-          <p:txBody>
-            <a:bodyPr rtlCol="0" anchor="ctr"/>
-            <a:lstStyle/>
-            <a:p>
-              <a:pPr algn="ctr"/>
-              <a:endParaRPr lang="en-US"/>
-            </a:p>
-          </p:txBody>
-        </p:sp>
-        <p:sp>
-          <p:nvSpPr>
-            <p:cNvPr id="201" name="Rectangle 64">
-              <a:extLst>
-                <a:ext uri="{FF2B5EF4-FFF2-40B4-BE49-F238E27FC236}">
-                  <a16:creationId xmlns:a16="http://schemas.microsoft.com/office/drawing/2014/main" id="{5AFBE5BF-E87A-408F-BBBD-44C3D04C042A}"/>
-                </a:ext>
-                <a:ext uri="{C183D7F6-B498-43B3-948B-1728B52AA6E4}">
-                  <adec:decorative xmlns:adec="http://schemas.microsoft.com/office/drawing/2017/decorative" val="1"/>
-                </a:ext>
-              </a:extLst>
-            </p:cNvPr>
-            <p:cNvSpPr/>
-            <p:nvPr>
-              <p:extLst>
-                <p:ext uri="{386F3935-93C4-4BCD-93E2-E3B085C9AB24}">
-                  <p16:designElem xmlns:p16="http://schemas.microsoft.com/office/powerpoint/2015/main" val="1"/>
-                </p:ext>
-              </p:extLst>
-            </p:nvPr>
-          </p:nvSpPr>
-          <p:spPr>
-            <a:xfrm>
-              <a:off x="7888211" y="73152"/>
-              <a:ext cx="54368" cy="59227"/>
-            </a:xfrm>
-            <a:prstGeom prst="ellipse">
-              <a:avLst/>
-            </a:prstGeom>
-            <a:solidFill>
-              <a:schemeClr val="accent1"/>
-            </a:solidFill>
-            <a:ln>
-              <a:noFill/>
-            </a:ln>
-          </p:spPr>
-          <p:style>
-            <a:lnRef idx="2">
-              <a:schemeClr val="accent1">
-                <a:shade val="50000"/>
-              </a:schemeClr>
-            </a:lnRef>
-            <a:fillRef idx="1">
-              <a:schemeClr val="accent1"/>
-            </a:fillRef>
-            <a:effectRef idx="0">
-              <a:schemeClr val="accent1"/>
-            </a:effectRef>
-            <a:fontRef idx="minor">
-              <a:schemeClr val="lt1"/>
-            </a:fontRef>
-          </p:style>
-          <p:txBody>
-            <a:bodyPr rtlCol="0" anchor="ctr"/>
-            <a:lstStyle/>
-            <a:p>
-              <a:pPr algn="ctr"/>
-              <a:endParaRPr lang="en-US"/>
-            </a:p>
-          </p:txBody>
-        </p:sp>
-        <p:sp>
-          <p:nvSpPr>
-            <p:cNvPr id="202" name="Rectangle 66">
-              <a:extLst>
-                <a:ext uri="{FF2B5EF4-FFF2-40B4-BE49-F238E27FC236}">
-                  <a16:creationId xmlns:a16="http://schemas.microsoft.com/office/drawing/2014/main" id="{1C27CF92-D148-45C8-88B6-F450B63DF1F2}"/>
-                </a:ext>
-                <a:ext uri="{C183D7F6-B498-43B3-948B-1728B52AA6E4}">
-                  <adec:decorative xmlns:adec="http://schemas.microsoft.com/office/drawing/2017/decorative" val="1"/>
-                </a:ext>
-              </a:extLst>
-            </p:cNvPr>
-            <p:cNvSpPr/>
-            <p:nvPr>
-              <p:extLst>
-                <p:ext uri="{386F3935-93C4-4BCD-93E2-E3B085C9AB24}">
-                  <p16:designElem xmlns:p16="http://schemas.microsoft.com/office/powerpoint/2015/main" val="1"/>
-                </p:ext>
-              </p:extLst>
-            </p:nvPr>
-          </p:nvSpPr>
-          <p:spPr>
-            <a:xfrm>
-              <a:off x="7888211" y="246888"/>
-              <a:ext cx="54368" cy="59227"/>
-            </a:xfrm>
-            <a:prstGeom prst="ellipse">
-              <a:avLst/>
-            </a:prstGeom>
-            <a:solidFill>
-              <a:schemeClr val="accent1"/>
-            </a:solidFill>
-            <a:ln>
-              <a:noFill/>
-            </a:ln>
-          </p:spPr>
-          <p:style>
-            <a:lnRef idx="2">
-              <a:schemeClr val="accent1">
-                <a:shade val="50000"/>
-              </a:schemeClr>
-            </a:lnRef>
-            <a:fillRef idx="1">
-              <a:schemeClr val="accent1"/>
-            </a:fillRef>
-            <a:effectRef idx="0">
-              <a:schemeClr val="accent1"/>
-            </a:effectRef>
-            <a:fontRef idx="minor">
-              <a:schemeClr val="lt1"/>
-            </a:fontRef>
-          </p:style>
-          <p:txBody>
-            <a:bodyPr rtlCol="0" anchor="ctr"/>
-            <a:lstStyle/>
-            <a:p>
-              <a:pPr algn="ctr"/>
-              <a:endParaRPr lang="en-US"/>
-            </a:p>
-          </p:txBody>
-        </p:sp>
-        <p:sp>
-          <p:nvSpPr>
-            <p:cNvPr id="203" name="Rectangle 64">
-              <a:extLst>
-                <a:ext uri="{FF2B5EF4-FFF2-40B4-BE49-F238E27FC236}">
-                  <a16:creationId xmlns:a16="http://schemas.microsoft.com/office/drawing/2014/main" id="{51CA2232-D147-480C-B1EE-665EE6ACC723}"/>
-                </a:ext>
-                <a:ext uri="{C183D7F6-B498-43B3-948B-1728B52AA6E4}">
-                  <adec:decorative xmlns:adec="http://schemas.microsoft.com/office/drawing/2017/decorative" val="1"/>
-                </a:ext>
-              </a:extLst>
-            </p:cNvPr>
-            <p:cNvSpPr/>
-            <p:nvPr>
-              <p:extLst>
-                <p:ext uri="{386F3935-93C4-4BCD-93E2-E3B085C9AB24}">
-                  <p16:designElem xmlns:p16="http://schemas.microsoft.com/office/powerpoint/2015/main" val="1"/>
-                </p:ext>
-              </p:extLst>
-            </p:nvPr>
-          </p:nvSpPr>
-          <p:spPr>
-            <a:xfrm>
-              <a:off x="7763256" y="73152"/>
-              <a:ext cx="54368" cy="59227"/>
-            </a:xfrm>
-            <a:prstGeom prst="ellipse">
-              <a:avLst/>
-            </a:prstGeom>
-            <a:solidFill>
-              <a:schemeClr val="accent1"/>
-            </a:solidFill>
-            <a:ln>
-              <a:noFill/>
-            </a:ln>
-          </p:spPr>
-          <p:style>
-            <a:lnRef idx="2">
-              <a:schemeClr val="accent1">
-                <a:shade val="50000"/>
-              </a:schemeClr>
-            </a:lnRef>
-            <a:fillRef idx="1">
-              <a:schemeClr val="accent1"/>
-            </a:fillRef>
-            <a:effectRef idx="0">
-              <a:schemeClr val="accent1"/>
-            </a:effectRef>
-            <a:fontRef idx="minor">
-              <a:schemeClr val="lt1"/>
-            </a:fontRef>
-          </p:style>
-          <p:txBody>
-            <a:bodyPr rtlCol="0" anchor="ctr"/>
-            <a:lstStyle/>
-            <a:p>
-              <a:pPr algn="ctr"/>
-              <a:endParaRPr lang="en-US"/>
-            </a:p>
-          </p:txBody>
-        </p:sp>
-        <p:sp>
-          <p:nvSpPr>
-            <p:cNvPr id="204" name="Rectangle 66">
-              <a:extLst>
-                <a:ext uri="{FF2B5EF4-FFF2-40B4-BE49-F238E27FC236}">
-                  <a16:creationId xmlns:a16="http://schemas.microsoft.com/office/drawing/2014/main" id="{7E67D92D-1CA9-43CE-8150-DF504F2BF052}"/>
-                </a:ext>
-                <a:ext uri="{C183D7F6-B498-43B3-948B-1728B52AA6E4}">
-                  <adec:decorative xmlns:adec="http://schemas.microsoft.com/office/drawing/2017/decorative" val="1"/>
-                </a:ext>
-              </a:extLst>
-            </p:cNvPr>
-            <p:cNvSpPr/>
-            <p:nvPr>
-              <p:extLst>
-                <p:ext uri="{386F3935-93C4-4BCD-93E2-E3B085C9AB24}">
-                  <p16:designElem xmlns:p16="http://schemas.microsoft.com/office/powerpoint/2015/main" val="1"/>
-                </p:ext>
-              </p:extLst>
-            </p:nvPr>
-          </p:nvSpPr>
-          <p:spPr>
-            <a:xfrm>
-              <a:off x="7763256" y="246888"/>
-              <a:ext cx="54368" cy="59227"/>
-            </a:xfrm>
-            <a:prstGeom prst="ellipse">
-              <a:avLst/>
-            </a:prstGeom>
-            <a:solidFill>
-              <a:schemeClr val="accent1"/>
-            </a:solidFill>
-            <a:ln>
-              <a:noFill/>
-            </a:ln>
-          </p:spPr>
-          <p:style>
-            <a:lnRef idx="2">
-              <a:schemeClr val="accent1">
-                <a:shade val="50000"/>
-              </a:schemeClr>
-            </a:lnRef>
-            <a:fillRef idx="1">
-              <a:schemeClr val="accent1"/>
-            </a:fillRef>
-            <a:effectRef idx="0">
-              <a:schemeClr val="accent1"/>
-            </a:effectRef>
-            <a:fontRef idx="minor">
-              <a:schemeClr val="lt1"/>
-            </a:fontRef>
-          </p:style>
-          <p:txBody>
-            <a:bodyPr rtlCol="0" anchor="ctr"/>
-            <a:lstStyle/>
-            <a:p>
-              <a:pPr algn="ctr"/>
-              <a:endParaRPr lang="en-US"/>
-            </a:p>
-          </p:txBody>
-        </p:sp>
-        <p:sp>
-          <p:nvSpPr>
-            <p:cNvPr id="205" name="Rectangle 64">
-              <a:extLst>
-                <a:ext uri="{FF2B5EF4-FFF2-40B4-BE49-F238E27FC236}">
-                  <a16:creationId xmlns:a16="http://schemas.microsoft.com/office/drawing/2014/main" id="{7B273169-B674-4C50-A14D-A943B9979284}"/>
-                </a:ext>
-                <a:ext uri="{C183D7F6-B498-43B3-948B-1728B52AA6E4}">
-                  <adec:decorative xmlns:adec="http://schemas.microsoft.com/office/drawing/2017/decorative" val="1"/>
-                </a:ext>
-              </a:extLst>
-            </p:cNvPr>
-            <p:cNvSpPr/>
-            <p:nvPr>
-              <p:extLst>
-                <p:ext uri="{386F3935-93C4-4BCD-93E2-E3B085C9AB24}">
-                  <p16:designElem xmlns:p16="http://schemas.microsoft.com/office/powerpoint/2015/main" val="1"/>
-                </p:ext>
-              </p:extLst>
-            </p:nvPr>
-          </p:nvSpPr>
-          <p:spPr>
-            <a:xfrm>
-              <a:off x="8887854" y="73152"/>
-              <a:ext cx="54368" cy="59227"/>
-            </a:xfrm>
-            <a:prstGeom prst="ellipse">
-              <a:avLst/>
-            </a:prstGeom>
-            <a:solidFill>
-              <a:schemeClr val="accent1"/>
-            </a:solidFill>
-            <a:ln>
-              <a:noFill/>
-            </a:ln>
-          </p:spPr>
-          <p:style>
-            <a:lnRef idx="2">
-              <a:schemeClr val="accent1">
-                <a:shade val="50000"/>
-              </a:schemeClr>
-            </a:lnRef>
-            <a:fillRef idx="1">
-              <a:schemeClr val="accent1"/>
-            </a:fillRef>
-            <a:effectRef idx="0">
-              <a:schemeClr val="accent1"/>
-            </a:effectRef>
-            <a:fontRef idx="minor">
-              <a:schemeClr val="lt1"/>
-            </a:fontRef>
-          </p:style>
-          <p:txBody>
-            <a:bodyPr rtlCol="0" anchor="ctr"/>
-            <a:lstStyle/>
-            <a:p>
-              <a:pPr algn="ctr"/>
-              <a:endParaRPr lang="en-US"/>
-            </a:p>
-          </p:txBody>
-        </p:sp>
-        <p:sp>
-          <p:nvSpPr>
-            <p:cNvPr id="206" name="Rectangle 66">
-              <a:extLst>
-                <a:ext uri="{FF2B5EF4-FFF2-40B4-BE49-F238E27FC236}">
-                  <a16:creationId xmlns:a16="http://schemas.microsoft.com/office/drawing/2014/main" id="{DF6183FA-653E-4533-9A0B-D249EC0B1553}"/>
-                </a:ext>
-                <a:ext uri="{C183D7F6-B498-43B3-948B-1728B52AA6E4}">
-                  <adec:decorative xmlns:adec="http://schemas.microsoft.com/office/drawing/2017/decorative" val="1"/>
-                </a:ext>
-              </a:extLst>
-            </p:cNvPr>
-            <p:cNvSpPr/>
-            <p:nvPr>
-              <p:extLst>
-                <p:ext uri="{386F3935-93C4-4BCD-93E2-E3B085C9AB24}">
-                  <p16:designElem xmlns:p16="http://schemas.microsoft.com/office/powerpoint/2015/main" val="1"/>
-                </p:ext>
-              </p:extLst>
-            </p:nvPr>
-          </p:nvSpPr>
-          <p:spPr>
-            <a:xfrm>
-              <a:off x="8887854" y="246888"/>
-              <a:ext cx="54368" cy="59227"/>
-            </a:xfrm>
-            <a:prstGeom prst="ellipse">
-              <a:avLst/>
-            </a:prstGeom>
-            <a:solidFill>
-              <a:schemeClr val="accent1"/>
-            </a:solidFill>
-            <a:ln>
-              <a:noFill/>
-            </a:ln>
-          </p:spPr>
-          <p:style>
-            <a:lnRef idx="2">
-              <a:schemeClr val="accent1">
-                <a:shade val="50000"/>
-              </a:schemeClr>
-            </a:lnRef>
-            <a:fillRef idx="1">
-              <a:schemeClr val="accent1"/>
-            </a:fillRef>
-            <a:effectRef idx="0">
-              <a:schemeClr val="accent1"/>
-            </a:effectRef>
-            <a:fontRef idx="minor">
-              <a:schemeClr val="lt1"/>
-            </a:fontRef>
-          </p:style>
-          <p:txBody>
-            <a:bodyPr rtlCol="0" anchor="ctr"/>
-            <a:lstStyle/>
-            <a:p>
-              <a:pPr algn="ctr"/>
-              <a:endParaRPr lang="en-US"/>
-            </a:p>
-          </p:txBody>
-        </p:sp>
-        <p:sp>
-          <p:nvSpPr>
-            <p:cNvPr id="207" name="Rectangle 64">
-              <a:extLst>
-                <a:ext uri="{FF2B5EF4-FFF2-40B4-BE49-F238E27FC236}">
-                  <a16:creationId xmlns:a16="http://schemas.microsoft.com/office/drawing/2014/main" id="{A82EFE58-AAB0-4925-A176-6FF36BF878A3}"/>
-                </a:ext>
-                <a:ext uri="{C183D7F6-B498-43B3-948B-1728B52AA6E4}">
-                  <adec:decorative xmlns:adec="http://schemas.microsoft.com/office/drawing/2017/decorative" val="1"/>
-                </a:ext>
-              </a:extLst>
-            </p:cNvPr>
-            <p:cNvSpPr/>
-            <p:nvPr>
-              <p:extLst>
-                <p:ext uri="{386F3935-93C4-4BCD-93E2-E3B085C9AB24}">
-                  <p16:designElem xmlns:p16="http://schemas.microsoft.com/office/powerpoint/2015/main" val="1"/>
-                </p:ext>
-              </p:extLst>
-            </p:nvPr>
-          </p:nvSpPr>
-          <p:spPr>
-            <a:xfrm>
-              <a:off x="8762899" y="73152"/>
-              <a:ext cx="54368" cy="59227"/>
-            </a:xfrm>
-            <a:prstGeom prst="ellipse">
-              <a:avLst/>
-            </a:prstGeom>
-            <a:solidFill>
-              <a:schemeClr val="accent1"/>
-            </a:solidFill>
-            <a:ln>
-              <a:noFill/>
-            </a:ln>
-          </p:spPr>
-          <p:style>
-            <a:lnRef idx="2">
-              <a:schemeClr val="accent1">
-                <a:shade val="50000"/>
-              </a:schemeClr>
-            </a:lnRef>
-            <a:fillRef idx="1">
-              <a:schemeClr val="accent1"/>
-            </a:fillRef>
-            <a:effectRef idx="0">
-              <a:schemeClr val="accent1"/>
-            </a:effectRef>
-            <a:fontRef idx="minor">
-              <a:schemeClr val="lt1"/>
-            </a:fontRef>
-          </p:style>
-          <p:txBody>
-            <a:bodyPr rtlCol="0" anchor="ctr"/>
-            <a:lstStyle/>
-            <a:p>
-              <a:pPr algn="ctr"/>
-              <a:endParaRPr lang="en-US"/>
-            </a:p>
-          </p:txBody>
-        </p:sp>
-        <p:sp>
-          <p:nvSpPr>
-            <p:cNvPr id="208" name="Rectangle 66">
-              <a:extLst>
-                <a:ext uri="{FF2B5EF4-FFF2-40B4-BE49-F238E27FC236}">
-                  <a16:creationId xmlns:a16="http://schemas.microsoft.com/office/drawing/2014/main" id="{3122AE75-4DBB-4E14-B0CA-DD1EAD89CE83}"/>
-                </a:ext>
-                <a:ext uri="{C183D7F6-B498-43B3-948B-1728B52AA6E4}">
-                  <adec:decorative xmlns:adec="http://schemas.microsoft.com/office/drawing/2017/decorative" val="1"/>
-                </a:ext>
-              </a:extLst>
-            </p:cNvPr>
-            <p:cNvSpPr/>
-            <p:nvPr>
-              <p:extLst>
-                <p:ext uri="{386F3935-93C4-4BCD-93E2-E3B085C9AB24}">
-                  <p16:designElem xmlns:p16="http://schemas.microsoft.com/office/powerpoint/2015/main" val="1"/>
-                </p:ext>
-              </p:extLst>
-            </p:nvPr>
-          </p:nvSpPr>
-          <p:spPr>
-            <a:xfrm>
-              <a:off x="8762899" y="246888"/>
-              <a:ext cx="54368" cy="59227"/>
-            </a:xfrm>
-            <a:prstGeom prst="ellipse">
-              <a:avLst/>
-            </a:prstGeom>
-            <a:solidFill>
-              <a:schemeClr val="accent1"/>
-            </a:solidFill>
-            <a:ln>
-              <a:noFill/>
-            </a:ln>
-          </p:spPr>
-          <p:style>
-            <a:lnRef idx="2">
-              <a:schemeClr val="accent1">
-                <a:shade val="50000"/>
-              </a:schemeClr>
-            </a:lnRef>
-            <a:fillRef idx="1">
-              <a:schemeClr val="accent1"/>
-            </a:fillRef>
-            <a:effectRef idx="0">
-              <a:schemeClr val="accent1"/>
-            </a:effectRef>
-            <a:fontRef idx="minor">
-              <a:schemeClr val="lt1"/>
-            </a:fontRef>
-          </p:style>
-          <p:txBody>
-            <a:bodyPr rtlCol="0" anchor="ctr"/>
-            <a:lstStyle/>
-            <a:p>
-              <a:pPr algn="ctr"/>
-              <a:endParaRPr lang="en-US"/>
-            </a:p>
-          </p:txBody>
-        </p:sp>
-        <p:sp>
-          <p:nvSpPr>
-            <p:cNvPr id="209" name="Rectangle 64">
-              <a:extLst>
-                <a:ext uri="{FF2B5EF4-FFF2-40B4-BE49-F238E27FC236}">
-                  <a16:creationId xmlns:a16="http://schemas.microsoft.com/office/drawing/2014/main" id="{4ED7E672-90FC-4E8C-9C43-3AAE391C6C23}"/>
-                </a:ext>
-                <a:ext uri="{C183D7F6-B498-43B3-948B-1728B52AA6E4}">
-                  <adec:decorative xmlns:adec="http://schemas.microsoft.com/office/drawing/2017/decorative" val="1"/>
-                </a:ext>
-              </a:extLst>
-            </p:cNvPr>
-            <p:cNvSpPr/>
-            <p:nvPr>
-              <p:extLst>
-                <p:ext uri="{386F3935-93C4-4BCD-93E2-E3B085C9AB24}">
-                  <p16:designElem xmlns:p16="http://schemas.microsoft.com/office/powerpoint/2015/main" val="1"/>
-                </p:ext>
-              </p:extLst>
-            </p:nvPr>
-          </p:nvSpPr>
-          <p:spPr>
-            <a:xfrm>
-              <a:off x="8637944" y="73152"/>
-              <a:ext cx="54368" cy="59227"/>
-            </a:xfrm>
-            <a:prstGeom prst="ellipse">
-              <a:avLst/>
-            </a:prstGeom>
-            <a:solidFill>
-              <a:schemeClr val="accent1"/>
-            </a:solidFill>
-            <a:ln>
-              <a:noFill/>
-            </a:ln>
-          </p:spPr>
-          <p:style>
-            <a:lnRef idx="2">
-              <a:schemeClr val="accent1">
-                <a:shade val="50000"/>
-              </a:schemeClr>
-            </a:lnRef>
-            <a:fillRef idx="1">
-              <a:schemeClr val="accent1"/>
-            </a:fillRef>
-            <a:effectRef idx="0">
-              <a:schemeClr val="accent1"/>
-            </a:effectRef>
-            <a:fontRef idx="minor">
-              <a:schemeClr val="lt1"/>
-            </a:fontRef>
-          </p:style>
-          <p:txBody>
-            <a:bodyPr rtlCol="0" anchor="ctr"/>
-            <a:lstStyle/>
-            <a:p>
-              <a:pPr algn="ctr"/>
-              <a:endParaRPr lang="en-US"/>
-            </a:p>
-          </p:txBody>
-        </p:sp>
-        <p:sp>
-          <p:nvSpPr>
-            <p:cNvPr id="210" name="Rectangle 66">
-              <a:extLst>
-                <a:ext uri="{FF2B5EF4-FFF2-40B4-BE49-F238E27FC236}">
-                  <a16:creationId xmlns:a16="http://schemas.microsoft.com/office/drawing/2014/main" id="{A5C0019E-5136-4C5E-A223-1E1717FD47C7}"/>
-                </a:ext>
-                <a:ext uri="{C183D7F6-B498-43B3-948B-1728B52AA6E4}">
-                  <adec:decorative xmlns:adec="http://schemas.microsoft.com/office/drawing/2017/decorative" val="1"/>
-                </a:ext>
-              </a:extLst>
-            </p:cNvPr>
-            <p:cNvSpPr/>
-            <p:nvPr>
-              <p:extLst>
-                <p:ext uri="{386F3935-93C4-4BCD-93E2-E3B085C9AB24}">
-                  <p16:designElem xmlns:p16="http://schemas.microsoft.com/office/powerpoint/2015/main" val="1"/>
-                </p:ext>
-              </p:extLst>
-            </p:nvPr>
-          </p:nvSpPr>
-          <p:spPr>
-            <a:xfrm>
-              <a:off x="8637944" y="246888"/>
-              <a:ext cx="54368" cy="59227"/>
-            </a:xfrm>
-            <a:prstGeom prst="ellipse">
-              <a:avLst/>
-            </a:prstGeom>
-            <a:solidFill>
-              <a:schemeClr val="accent1"/>
-            </a:solidFill>
-            <a:ln>
-              <a:noFill/>
-            </a:ln>
-          </p:spPr>
-          <p:style>
-            <a:lnRef idx="2">
-              <a:schemeClr val="accent1">
-                <a:shade val="50000"/>
-              </a:schemeClr>
-            </a:lnRef>
-            <a:fillRef idx="1">
-              <a:schemeClr val="accent1"/>
-            </a:fillRef>
-            <a:effectRef idx="0">
-              <a:schemeClr val="accent1"/>
-            </a:effectRef>
-            <a:fontRef idx="minor">
-              <a:schemeClr val="lt1"/>
-            </a:fontRef>
-          </p:style>
-          <p:txBody>
-            <a:bodyPr rtlCol="0" anchor="ctr"/>
-            <a:lstStyle/>
-            <a:p>
-              <a:pPr algn="ctr"/>
-              <a:endParaRPr lang="en-US"/>
-            </a:p>
-          </p:txBody>
-        </p:sp>
-        <p:sp>
-          <p:nvSpPr>
-            <p:cNvPr id="211" name="Rectangle 64">
-              <a:extLst>
-                <a:ext uri="{FF2B5EF4-FFF2-40B4-BE49-F238E27FC236}">
-                  <a16:creationId xmlns:a16="http://schemas.microsoft.com/office/drawing/2014/main" id="{29705F60-CFE6-47C5-96E5-05E7731FC84C}"/>
-                </a:ext>
-                <a:ext uri="{C183D7F6-B498-43B3-948B-1728B52AA6E4}">
-                  <adec:decorative xmlns:adec="http://schemas.microsoft.com/office/drawing/2017/decorative" val="1"/>
-                </a:ext>
-              </a:extLst>
-            </p:cNvPr>
-            <p:cNvSpPr/>
-            <p:nvPr>
-              <p:extLst>
-                <p:ext uri="{386F3935-93C4-4BCD-93E2-E3B085C9AB24}">
-                  <p16:designElem xmlns:p16="http://schemas.microsoft.com/office/powerpoint/2015/main" val="1"/>
-                </p:ext>
-              </p:extLst>
-            </p:nvPr>
-          </p:nvSpPr>
-          <p:spPr>
-            <a:xfrm>
-              <a:off x="8512988" y="73152"/>
-              <a:ext cx="54368" cy="59227"/>
-            </a:xfrm>
-            <a:prstGeom prst="ellipse">
-              <a:avLst/>
-            </a:prstGeom>
-            <a:solidFill>
-              <a:schemeClr val="accent1"/>
-            </a:solidFill>
-            <a:ln>
-              <a:noFill/>
-            </a:ln>
-          </p:spPr>
-          <p:style>
-            <a:lnRef idx="2">
-              <a:schemeClr val="accent1">
-                <a:shade val="50000"/>
-              </a:schemeClr>
-            </a:lnRef>
-            <a:fillRef idx="1">
-              <a:schemeClr val="accent1"/>
-            </a:fillRef>
-            <a:effectRef idx="0">
-              <a:schemeClr val="accent1"/>
-            </a:effectRef>
-            <a:fontRef idx="minor">
-              <a:schemeClr val="lt1"/>
-            </a:fontRef>
-          </p:style>
-          <p:txBody>
-            <a:bodyPr rtlCol="0" anchor="ctr"/>
-            <a:lstStyle/>
-            <a:p>
-              <a:pPr algn="ctr"/>
-              <a:endParaRPr lang="en-US"/>
-            </a:p>
-          </p:txBody>
-        </p:sp>
-        <p:sp>
-          <p:nvSpPr>
-            <p:cNvPr id="212" name="Rectangle 66">
-              <a:extLst>
-                <a:ext uri="{FF2B5EF4-FFF2-40B4-BE49-F238E27FC236}">
-                  <a16:creationId xmlns:a16="http://schemas.microsoft.com/office/drawing/2014/main" id="{090E047C-18BC-4180-8D10-9F18F517BAEA}"/>
-                </a:ext>
-                <a:ext uri="{C183D7F6-B498-43B3-948B-1728B52AA6E4}">
-                  <adec:decorative xmlns:adec="http://schemas.microsoft.com/office/drawing/2017/decorative" val="1"/>
-                </a:ext>
-              </a:extLst>
-            </p:cNvPr>
-            <p:cNvSpPr/>
-            <p:nvPr>
-              <p:extLst>
-                <p:ext uri="{386F3935-93C4-4BCD-93E2-E3B085C9AB24}">
-                  <p16:designElem xmlns:p16="http://schemas.microsoft.com/office/powerpoint/2015/main" val="1"/>
-                </p:ext>
-              </p:extLst>
-            </p:nvPr>
-          </p:nvSpPr>
-          <p:spPr>
-            <a:xfrm>
-              <a:off x="8512988" y="246888"/>
-              <a:ext cx="54368" cy="59227"/>
-            </a:xfrm>
-            <a:prstGeom prst="ellipse">
-              <a:avLst/>
-            </a:prstGeom>
-            <a:solidFill>
-              <a:schemeClr val="accent1"/>
-            </a:solidFill>
-            <a:ln>
-              <a:noFill/>
-            </a:ln>
-          </p:spPr>
-          <p:style>
-            <a:lnRef idx="2">
-              <a:schemeClr val="accent1">
-                <a:shade val="50000"/>
-              </a:schemeClr>
-            </a:lnRef>
-            <a:fillRef idx="1">
-              <a:schemeClr val="accent1"/>
-            </a:fillRef>
-            <a:effectRef idx="0">
-              <a:schemeClr val="accent1"/>
-            </a:effectRef>
-            <a:fontRef idx="minor">
-              <a:schemeClr val="lt1"/>
-            </a:fontRef>
-          </p:style>
-          <p:txBody>
-            <a:bodyPr rtlCol="0" anchor="ctr"/>
-            <a:lstStyle/>
-            <a:p>
-              <a:pPr algn="ctr"/>
-              <a:endParaRPr lang="en-US"/>
-            </a:p>
-          </p:txBody>
-        </p:sp>
-        <p:sp>
-          <p:nvSpPr>
-            <p:cNvPr id="213" name="Rectangle 64">
-              <a:extLst>
-                <a:ext uri="{FF2B5EF4-FFF2-40B4-BE49-F238E27FC236}">
-                  <a16:creationId xmlns:a16="http://schemas.microsoft.com/office/drawing/2014/main" id="{A153194A-C8B1-46DB-9C6B-9847B06FAEFE}"/>
-                </a:ext>
-                <a:ext uri="{C183D7F6-B498-43B3-948B-1728B52AA6E4}">
-                  <adec:decorative xmlns:adec="http://schemas.microsoft.com/office/drawing/2017/decorative" val="1"/>
-                </a:ext>
-              </a:extLst>
-            </p:cNvPr>
-            <p:cNvSpPr/>
-            <p:nvPr>
-              <p:extLst>
-                <p:ext uri="{386F3935-93C4-4BCD-93E2-E3B085C9AB24}">
-                  <p16:designElem xmlns:p16="http://schemas.microsoft.com/office/powerpoint/2015/main" val="1"/>
-                </p:ext>
-              </p:extLst>
-            </p:nvPr>
-          </p:nvSpPr>
-          <p:spPr>
-            <a:xfrm>
-              <a:off x="8388033" y="73152"/>
-              <a:ext cx="54368" cy="59227"/>
-            </a:xfrm>
-            <a:prstGeom prst="ellipse">
-              <a:avLst/>
-            </a:prstGeom>
-            <a:solidFill>
-              <a:schemeClr val="accent1"/>
-            </a:solidFill>
-            <a:ln>
-              <a:noFill/>
-            </a:ln>
-          </p:spPr>
-          <p:style>
-            <a:lnRef idx="2">
-              <a:schemeClr val="accent1">
-                <a:shade val="50000"/>
-              </a:schemeClr>
-            </a:lnRef>
-            <a:fillRef idx="1">
-              <a:schemeClr val="accent1"/>
-            </a:fillRef>
-            <a:effectRef idx="0">
-              <a:schemeClr val="accent1"/>
-            </a:effectRef>
-            <a:fontRef idx="minor">
-              <a:schemeClr val="lt1"/>
-            </a:fontRef>
-          </p:style>
-          <p:txBody>
-            <a:bodyPr rtlCol="0" anchor="ctr"/>
-            <a:lstStyle/>
-            <a:p>
-              <a:pPr algn="ctr"/>
-              <a:endParaRPr lang="en-US"/>
-            </a:p>
-          </p:txBody>
-        </p:sp>
-        <p:sp>
-          <p:nvSpPr>
-            <p:cNvPr id="214" name="Rectangle 66">
-              <a:extLst>
-                <a:ext uri="{FF2B5EF4-FFF2-40B4-BE49-F238E27FC236}">
-                  <a16:creationId xmlns:a16="http://schemas.microsoft.com/office/drawing/2014/main" id="{5C0235EA-4E98-43EA-9AAE-2BD893DEAF55}"/>
-                </a:ext>
-                <a:ext uri="{C183D7F6-B498-43B3-948B-1728B52AA6E4}">
-                  <adec:decorative xmlns:adec="http://schemas.microsoft.com/office/drawing/2017/decorative" val="1"/>
-                </a:ext>
-              </a:extLst>
-            </p:cNvPr>
-            <p:cNvSpPr/>
-            <p:nvPr>
-              <p:extLst>
-                <p:ext uri="{386F3935-93C4-4BCD-93E2-E3B085C9AB24}">
-                  <p16:designElem xmlns:p16="http://schemas.microsoft.com/office/powerpoint/2015/main" val="1"/>
-                </p:ext>
-              </p:extLst>
-            </p:nvPr>
-          </p:nvSpPr>
-          <p:spPr>
-            <a:xfrm>
-              <a:off x="8388033" y="246888"/>
-              <a:ext cx="54368" cy="59227"/>
-            </a:xfrm>
-            <a:prstGeom prst="ellipse">
-              <a:avLst/>
-            </a:prstGeom>
-            <a:solidFill>
-              <a:schemeClr val="accent1"/>
-            </a:solidFill>
-            <a:ln>
-              <a:noFill/>
-            </a:ln>
-          </p:spPr>
-          <p:style>
-            <a:lnRef idx="2">
-              <a:schemeClr val="accent1">
-                <a:shade val="50000"/>
-              </a:schemeClr>
-            </a:lnRef>
-            <a:fillRef idx="1">
-              <a:schemeClr val="accent1"/>
-            </a:fillRef>
-            <a:effectRef idx="0">
-              <a:schemeClr val="accent1"/>
-            </a:effectRef>
-            <a:fontRef idx="minor">
-              <a:schemeClr val="lt1"/>
-            </a:fontRef>
-          </p:style>
-          <p:txBody>
-            <a:bodyPr rtlCol="0" anchor="ctr"/>
-            <a:lstStyle/>
-            <a:p>
-              <a:pPr algn="ctr"/>
-              <a:endParaRPr lang="en-US"/>
-            </a:p>
-          </p:txBody>
-        </p:sp>
-      </p:grpSp>
-      <p:pic>
-        <p:nvPicPr>
-          <p:cNvPr id="1026" name="Picture 2" descr="Facial Expression Recognition – mc.ai">
-            <a:extLst>
-              <a:ext uri="{FF2B5EF4-FFF2-40B4-BE49-F238E27FC236}">
-                <a16:creationId xmlns:a16="http://schemas.microsoft.com/office/drawing/2014/main" id="{3310CEF3-C6CB-4FB5-A91C-C29223A1F061}"/>
-              </a:ext>
-            </a:extLst>
-          </p:cNvPr>
-          <p:cNvPicPr>
-            <a:picLocks noChangeAspect="1" noChangeArrowheads="1"/>
-          </p:cNvPicPr>
-          <p:nvPr/>
-        </p:nvPicPr>
-        <p:blipFill rotWithShape="1">
-          <a:blip r:embed="rId2">
-            <a:extLst>
-              <a:ext uri="{28A0092B-C50C-407E-A947-70E740481C1C}">
-                <a14:useLocalDpi xmlns:a14="http://schemas.microsoft.com/office/drawing/2010/main" val="0"/>
-              </a:ext>
-            </a:extLst>
-          </a:blip>
-          <a:srcRect t="33191" b="15751"/>
-          <a:stretch/>
-        </p:blipFill>
-        <p:spPr bwMode="auto">
-          <a:xfrm>
-            <a:off x="5509008" y="818161"/>
-            <a:ext cx="6428067" cy="1846149"/>
-          </a:xfrm>
-          <a:prstGeom prst="rect">
-            <a:avLst/>
-          </a:prstGeom>
-          <a:noFill/>
-          <a:extLst>
-            <a:ext uri="{909E8E84-426E-40DD-AFC4-6F175D3DCCD1}">
-              <a14:hiddenFill xmlns:a14="http://schemas.microsoft.com/office/drawing/2010/main">
-                <a:solidFill>
-                  <a:srgbClr val="FFFFFF"/>
-                </a:solidFill>
-              </a14:hiddenFill>
-            </a:ext>
-          </a:extLst>
-        </p:spPr>
-      </p:pic>
-      <p:sp>
-        <p:nvSpPr>
-          <p:cNvPr id="215" name="Rectangle 214">
-            <a:extLst>
-              <a:ext uri="{FF2B5EF4-FFF2-40B4-BE49-F238E27FC236}">
-                <a16:creationId xmlns:a16="http://schemas.microsoft.com/office/drawing/2014/main" id="{D9F5512A-48E1-4C07-B75E-3CCC517B6804}"/>
-              </a:ext>
-              <a:ext uri="{C183D7F6-B498-43B3-948B-1728B52AA6E4}">
-                <adec:decorative xmlns:adec="http://schemas.microsoft.com/office/drawing/2017/decorative" val="1"/>
-              </a:ext>
-            </a:extLst>
-          </p:cNvPr>
-          <p:cNvSpPr>
-            <a:spLocks noGrp="1" noRot="1" noChangeAspect="1" noMove="1" noResize="1" noEditPoints="1" noAdjustHandles="1" noChangeArrowheads="1" noChangeShapeType="1" noTextEdit="1"/>
-          </p:cNvSpPr>
-          <p:nvPr>
-            <p:extLst>
-              <p:ext uri="{386F3935-93C4-4BCD-93E2-E3B085C9AB24}">
-                <p16:designElem xmlns:p16="http://schemas.microsoft.com/office/powerpoint/2015/main" val="1"/>
-              </p:ext>
-            </p:extLst>
-          </p:nvPr>
         </p:nvSpPr>
         <p:spPr>
           <a:xfrm>
-            <a:off x="-1" y="3233650"/>
-            <a:ext cx="606972" cy="3624350"/>
+            <a:off x="8038539" y="3295432"/>
+            <a:ext cx="2987899" cy="2987899"/>
           </a:xfrm>
-          <a:prstGeom prst="rect">
-            <a:avLst/>
+          <a:prstGeom prst="arc">
+            <a:avLst>
+              <a:gd name="adj1" fmla="val 14441841"/>
+              <a:gd name="adj2" fmla="val 0"/>
+            </a:avLst>
           </a:prstGeom>
-          <a:solidFill>
-            <a:schemeClr val="accent1"/>
-          </a:solidFill>
-          <a:ln>
-            <a:noFill/>
+          <a:ln w="127000" cap="rnd">
+            <a:solidFill>
+              <a:schemeClr val="accent4"/>
+            </a:solidFill>
+            <a:prstDash val="dash"/>
+            <a:miter lim="800000"/>
           </a:ln>
         </p:spPr>
         <p:style>
-          <a:lnRef idx="2">
-            <a:schemeClr val="accent1">
-              <a:shade val="50000"/>
-            </a:schemeClr>
+          <a:lnRef idx="1">
+            <a:schemeClr val="accent1"/>
           </a:lnRef>
-          <a:fillRef idx="1">
+          <a:fillRef idx="0">
             <a:schemeClr val="accent1"/>
           </a:fillRef>
           <a:effectRef idx="0">
             <a:schemeClr val="accent1"/>
           </a:effectRef>
           <a:fontRef idx="minor">
-            <a:schemeClr val="lt1"/>
+            <a:schemeClr val="tx1"/>
           </a:fontRef>
         </p:style>
         <p:txBody>
           <a:bodyPr rtlCol="0" anchor="ctr"/>
           <a:lstStyle/>
           <a:p>
-            <a:pPr algn="ctr"/>
-            <a:endParaRPr lang="en-US"/>
-          </a:p>
-        </p:txBody>
-      </p:sp>
+            <a:pPr marL="0" marR="0" lvl="0" indent="0" algn="ctr" defTabSz="914400" rtl="0" eaLnBrk="1" fontAlgn="auto" latinLnBrk="0" hangingPunct="1">
+              <a:lnSpc>
+                <a:spcPct val="100000"/>
+              </a:lnSpc>
+              <a:spcBef>
+                <a:spcPts val="0"/>
+              </a:spcBef>
+              <a:spcAft>
+                <a:spcPts val="0"/>
+              </a:spcAft>
+              <a:buClrTx/>
+              <a:buSzTx/>
+              <a:buFontTx/>
+              <a:buNone/>
+              <a:tabLst/>
+              <a:defRPr/>
+            </a:pPr>
+            <a:endParaRPr kumimoji="0" lang="en-US" sz="1800" b="0" i="0" u="none" strike="noStrike" kern="1200" cap="none" spc="0" normalizeH="0" baseline="0" noProof="0">
+              <a:ln>
+                <a:noFill/>
+              </a:ln>
+              <a:solidFill>
+                <a:srgbClr val="000000"/>
+              </a:solidFill>
+              <a:effectLst/>
+              <a:uLnTx/>
+              <a:uFillTx/>
+              <a:latin typeface="Calibri" panose="020F0502020204030204"/>
+              <a:ea typeface="+mn-ea"/>
+              <a:cs typeface="+mn-cs"/>
+            </a:endParaRPr>
+          </a:p>
+        </p:txBody>
+      </p:sp>
+      <p:pic>
+        <p:nvPicPr>
+          <p:cNvPr id="30" name="Picture 29">
+            <a:extLst>
+              <a:ext uri="{FF2B5EF4-FFF2-40B4-BE49-F238E27FC236}">
+                <a16:creationId xmlns:a16="http://schemas.microsoft.com/office/drawing/2014/main" id="{02B76DD1-3A4A-469A-B368-57DDE0BC00B1}"/>
+              </a:ext>
+            </a:extLst>
+          </p:cNvPr>
+          <p:cNvPicPr>
+            <a:picLocks noChangeAspect="1"/>
+          </p:cNvPicPr>
+          <p:nvPr/>
+        </p:nvPicPr>
+        <p:blipFill rotWithShape="1">
+          <a:blip r:embed="rId2">
+            <a:extLst>
+              <a:ext uri="{28A0092B-C50C-407E-A947-70E740481C1C}">
+                <a14:useLocalDpi xmlns:a14="http://schemas.microsoft.com/office/drawing/2010/main" val="0"/>
+              </a:ext>
+            </a:extLst>
+          </a:blip>
+          <a:srcRect r="35970"/>
+          <a:stretch/>
+        </p:blipFill>
+        <p:spPr>
+          <a:xfrm>
+            <a:off x="3814763" y="1506538"/>
+            <a:ext cx="3603625" cy="1630363"/>
+          </a:xfrm>
+          <a:prstGeom prst="rect">
+            <a:avLst/>
+          </a:prstGeom>
+        </p:spPr>
+      </p:pic>
       <p:pic>
         <p:nvPicPr>
           <p:cNvPr id="5" name="Picture 4" descr="A person brushing his teeth&#10;&#10;Description automatically generated">
@@ -4937,8 +3827,44 @@
         </p:blipFill>
         <p:spPr>
           <a:xfrm>
-            <a:off x="5956045" y="3482471"/>
-            <a:ext cx="5533993" cy="3126707"/>
+            <a:off x="719138" y="1506538"/>
+            <a:ext cx="3013075" cy="1630363"/>
+          </a:xfrm>
+          <a:prstGeom prst="rect">
+            <a:avLst/>
+          </a:prstGeom>
+        </p:spPr>
+      </p:pic>
+      <p:pic>
+        <p:nvPicPr>
+          <p:cNvPr id="31" name="Picture 30">
+            <a:extLst>
+              <a:ext uri="{FF2B5EF4-FFF2-40B4-BE49-F238E27FC236}">
+                <a16:creationId xmlns:a16="http://schemas.microsoft.com/office/drawing/2014/main" id="{E5373D83-97AD-45C6-B832-6682434BECF2}"/>
+              </a:ext>
+            </a:extLst>
+          </p:cNvPr>
+          <p:cNvPicPr>
+            <a:picLocks noChangeAspect="1"/>
+          </p:cNvPicPr>
+          <p:nvPr/>
+        </p:nvPicPr>
+        <p:blipFill>
+          <a:blip r:embed="rId4">
+            <a:extLst>
+              <a:ext uri="{28A0092B-C50C-407E-A947-70E740481C1C}">
+                <a14:useLocalDpi xmlns:a14="http://schemas.microsoft.com/office/drawing/2010/main" val="0"/>
+              </a:ext>
+            </a:extLst>
+          </a:blip>
+          <a:stretch>
+            <a:fillRect/>
+          </a:stretch>
+        </p:blipFill>
+        <p:spPr>
+          <a:xfrm>
+            <a:off x="7499350" y="1506538"/>
+            <a:ext cx="3960813" cy="1630363"/>
           </a:xfrm>
           <a:prstGeom prst="rect">
             <a:avLst/>

</xml_diff>